<commit_message>
Tutorial 9 slides fix
</commit_message>
<xml_diff>
--- a/Tutorial_7/CS1010_TutC09_7.pptx
+++ b/Tutorial_7/CS1010_TutC09_7.pptx
@@ -234,7 +234,7 @@
           <a:p>
             <a:fld id="{9CBF1339-9A09-4147-A280-CE820B321722}" type="datetimeFigureOut">
               <a:rPr lang="en-SG" smtClean="0"/>
-              <a:t>14/10/2018</a:t>
+              <a:t>15/10/2018</a:t>
             </a:fld>
             <a:endParaRPr lang="en-SG"/>
           </a:p>
@@ -2089,7 +2089,7 @@
             <a:fld id="{08B9EBBA-996F-894A-B54A-D6246ED52CEA}" type="datetimeFigureOut">
               <a:rPr lang="en-US" smtClean="0"/>
               <a:pPr/>
-              <a:t>10/14/2018</a:t>
+              <a:t>10/15/2018</a:t>
             </a:fld>
             <a:endParaRPr lang="en-US" dirty="0"/>
           </a:p>
@@ -2421,7 +2421,7 @@
             <a:fld id="{C6C52C72-DE31-F449-A4ED-4C594FD91407}" type="datetimeFigureOut">
               <a:rPr lang="en-US" smtClean="0"/>
               <a:pPr/>
-              <a:t>10/14/2018</a:t>
+              <a:t>10/15/2018</a:t>
             </a:fld>
             <a:endParaRPr lang="en-US" dirty="0"/>
           </a:p>
@@ -2603,7 +2603,7 @@
             <a:fld id="{ED62726E-379B-B349-9EED-81ED093FA806}" type="datetimeFigureOut">
               <a:rPr lang="en-US" smtClean="0"/>
               <a:pPr/>
-              <a:t>10/14/2018</a:t>
+              <a:t>10/15/2018</a:t>
             </a:fld>
             <a:endParaRPr lang="en-US" dirty="0"/>
           </a:p>
@@ -2791,7 +2791,7 @@
             <a:fld id="{9B3A1323-8D79-1946-B0D7-40001CF92E9D}" type="datetimeFigureOut">
               <a:rPr lang="en-US" smtClean="0"/>
               <a:pPr/>
-              <a:t>10/14/2018</a:t>
+              <a:t>10/15/2018</a:t>
             </a:fld>
             <a:endParaRPr lang="en-US" dirty="0"/>
           </a:p>
@@ -3070,7 +3070,7 @@
             <a:fld id="{8DFA1846-DA80-1C48-A609-854EA85C59AD}" type="datetimeFigureOut">
               <a:rPr lang="en-US" smtClean="0"/>
               <a:pPr/>
-              <a:t>10/14/2018</a:t>
+              <a:t>10/15/2018</a:t>
             </a:fld>
             <a:endParaRPr lang="en-US" dirty="0"/>
           </a:p>
@@ -3468,7 +3468,7 @@
             <a:fld id="{57302355-E14B-8545-A8F8-0FE83CC9D524}" type="datetimeFigureOut">
               <a:rPr lang="en-US" smtClean="0"/>
               <a:pPr/>
-              <a:t>10/14/2018</a:t>
+              <a:t>10/15/2018</a:t>
             </a:fld>
             <a:endParaRPr lang="en-US" dirty="0"/>
           </a:p>
@@ -3947,7 +3947,7 @@
             <a:fld id="{02640F58-564D-2B4F-AE67-E407BA4FCF45}" type="datetimeFigureOut">
               <a:rPr lang="en-US" smtClean="0"/>
               <a:pPr/>
-              <a:t>10/14/2018</a:t>
+              <a:t>10/15/2018</a:t>
             </a:fld>
             <a:endParaRPr lang="en-US" dirty="0"/>
           </a:p>
@@ -4067,7 +4067,7 @@
             <a:fld id="{F13A34C8-038E-2045-AF43-DF7DBB8E0E9E}" type="datetimeFigureOut">
               <a:rPr lang="en-US" smtClean="0"/>
               <a:pPr/>
-              <a:t>10/14/2018</a:t>
+              <a:t>10/15/2018</a:t>
             </a:fld>
             <a:endParaRPr lang="en-US" dirty="0"/>
           </a:p>
@@ -4164,7 +4164,7 @@
             <a:fld id="{8818C68F-D26B-8F47-958C-23B49CF8A634}" type="datetimeFigureOut">
               <a:rPr lang="en-US" smtClean="0"/>
               <a:pPr/>
-              <a:t>10/14/2018</a:t>
+              <a:t>10/15/2018</a:t>
             </a:fld>
             <a:endParaRPr lang="en-US" dirty="0"/>
           </a:p>
@@ -4512,7 +4512,7 @@
             <a:fld id="{D0DF5E60-9974-AC48-9591-99C2BB44B7CF}" type="datetimeFigureOut">
               <a:rPr lang="en-US" smtClean="0"/>
               <a:pPr/>
-              <a:t>10/14/2018</a:t>
+              <a:t>10/15/2018</a:t>
             </a:fld>
             <a:endParaRPr lang="en-US" dirty="0"/>
           </a:p>
@@ -4902,7 +4902,7 @@
             <a:fld id="{09B482E8-6E0E-1B4F-B1FD-C69DB9E858D9}" type="datetimeFigureOut">
               <a:rPr lang="en-US" smtClean="0"/>
               <a:pPr/>
-              <a:t>10/14/2018</a:t>
+              <a:t>10/15/2018</a:t>
             </a:fld>
             <a:endParaRPr lang="en-US" dirty="0"/>
           </a:p>
@@ -9484,31 +9484,6 @@
               <a:rPr lang="en-SG" dirty="0"/>
               <a:t>Problem Set 17.2</a:t>
             </a:r>
-          </a:p>
-        </p:txBody>
-      </p:sp>
-      <p:sp>
-        <p:nvSpPr>
-          <p:cNvPr id="3" name="Content Placeholder 2">
-            <a:extLst>
-              <a:ext uri="{FF2B5EF4-FFF2-40B4-BE49-F238E27FC236}">
-                <a16:creationId xmlns:a16="http://schemas.microsoft.com/office/drawing/2014/main" id="{55FA2D43-01AD-4461-BD9A-B74EA636232B}"/>
-              </a:ext>
-            </a:extLst>
-          </p:cNvPr>
-          <p:cNvSpPr>
-            <a:spLocks noGrp="1"/>
-          </p:cNvSpPr>
-          <p:nvPr>
-            <p:ph idx="1"/>
-          </p:nvPr>
-        </p:nvSpPr>
-        <p:spPr/>
-        <p:txBody>
-          <a:bodyPr/>
-          <a:lstStyle/>
-          <a:p>
-            <a:endParaRPr lang="en-SG"/>
           </a:p>
         </p:txBody>
       </p:sp>

</xml_diff>